<commit_message>
Array und Objekete Folien
</commit_message>
<xml_diff>
--- a/7. Javascript/Slides/JS Arrays und Objekte.pptx
+++ b/7. Javascript/Slides/JS Arrays und Objekte.pptx
@@ -22,8 +22,8 @@
     <p:sldId id="377" r:id="rId16"/>
     <p:sldId id="378" r:id="rId17"/>
     <p:sldId id="379" r:id="rId18"/>
-    <p:sldId id="404" r:id="rId19"/>
-    <p:sldId id="412" r:id="rId20"/>
+    <p:sldId id="412" r:id="rId19"/>
+    <p:sldId id="404" r:id="rId20"/>
     <p:sldId id="406" r:id="rId21"/>
     <p:sldId id="407" r:id="rId22"/>
     <p:sldId id="292" r:id="rId23"/>
@@ -6995,201 +6995,6 @@
       </p:grpSpPr>
       <p:sp>
         <p:nvSpPr>
-          <p:cNvPr id="2" name="Titel 1"/>
-          <p:cNvSpPr>
-            <a:spLocks noGrp="1"/>
-          </p:cNvSpPr>
-          <p:nvPr>
-            <p:ph type="title"/>
-          </p:nvPr>
-        </p:nvSpPr>
-        <p:spPr>
-          <a:xfrm>
-            <a:off x="1066800" y="685800"/>
-            <a:ext cx="8915402" cy="1371600"/>
-          </a:xfrm>
-        </p:spPr>
-        <p:txBody>
-          <a:bodyPr/>
-          <a:lstStyle/>
-          <a:p>
-            <a:r>
-              <a:rPr lang="de-AT" dirty="0"/>
-              <a:t>Übungen zu Arrays &amp; Objekte</a:t>
-            </a:r>
-            <a:endParaRPr lang="en-US" dirty="0"/>
-          </a:p>
-        </p:txBody>
-      </p:sp>
-      <p:sp>
-        <p:nvSpPr>
-          <p:cNvPr id="3" name="Inhaltsplatzhalter 2"/>
-          <p:cNvSpPr>
-            <a:spLocks noGrp="1"/>
-          </p:cNvSpPr>
-          <p:nvPr>
-            <p:ph idx="1"/>
-          </p:nvPr>
-        </p:nvSpPr>
-        <p:spPr>
-          <a:xfrm>
-            <a:off x="1066800" y="2057400"/>
-            <a:ext cx="7327388" cy="4137259"/>
-          </a:xfrm>
-        </p:spPr>
-        <p:txBody>
-          <a:bodyPr>
-            <a:normAutofit fontScale="92500" lnSpcReduction="20000"/>
-          </a:bodyPr>
-          <a:lstStyle/>
-          <a:p>
-            <a:pPr marL="0" indent="0">
-              <a:buNone/>
-            </a:pPr>
-            <a:r>
-              <a:rPr lang="de-DE" dirty="0"/>
-              <a:t>1. Definiere die Wochentage in einem </a:t>
-            </a:r>
-            <a:r>
-              <a:rPr lang="de-DE" b="1" dirty="0"/>
-              <a:t>Array</a:t>
-            </a:r>
-            <a:r>
-              <a:rPr lang="de-DE" dirty="0"/>
-              <a:t>, lese vom Nutzer eine Zahl von 1-7 ein und gib den entsprechenden Wochentag aus dem Array aus.</a:t>
-            </a:r>
-          </a:p>
-          <a:p>
-            <a:pPr marL="0" indent="0">
-              <a:buNone/>
-            </a:pPr>
-            <a:r>
-              <a:rPr lang="de-DE" dirty="0"/>
-              <a:t>2. Definiere ein </a:t>
-            </a:r>
-            <a:r>
-              <a:rPr lang="de-DE" b="1" dirty="0"/>
-              <a:t>Objekt </a:t>
-            </a:r>
-            <a:r>
-              <a:rPr lang="de-DE" dirty="0"/>
-              <a:t>mit diversen Daten eures </a:t>
-            </a:r>
-            <a:r>
-              <a:rPr lang="de-DE" dirty="0" err="1"/>
-              <a:t>lieblings</a:t>
-            </a:r>
-            <a:r>
-              <a:rPr lang="de-DE" dirty="0"/>
-              <a:t> Fahrzeugs (Auto, Motorrad, Fahrrad, ...), dabei sollten verschiedene Datentypen verwendet werden. Gebt die Daten mit einem Template </a:t>
-            </a:r>
-            <a:r>
-              <a:rPr lang="de-DE" dirty="0" err="1"/>
-              <a:t>Literal</a:t>
-            </a:r>
-            <a:r>
-              <a:rPr lang="de-DE" dirty="0"/>
-              <a:t> schön formatiert aus.</a:t>
-            </a:r>
-          </a:p>
-          <a:p>
-            <a:pPr marL="0" indent="0">
-              <a:buNone/>
-            </a:pPr>
-            <a:r>
-              <a:rPr lang="de-DE" dirty="0"/>
-              <a:t>3. Definiere die abgebildete Tabelle als </a:t>
-            </a:r>
-            <a:r>
-              <a:rPr lang="de-DE" b="1" dirty="0"/>
-              <a:t>zweidimensionales Array </a:t>
-            </a:r>
-            <a:r>
-              <a:rPr lang="de-DE" dirty="0"/>
-              <a:t>und lass den Benutzer eine Zeilen und Spaltennummer angeben, gib den gewünschten Wert </a:t>
-            </a:r>
-            <a:r>
-              <a:rPr lang="en-US" dirty="0" err="1"/>
-              <a:t>aus.</a:t>
-            </a:r>
-            <a:endParaRPr lang="en-US" dirty="0"/>
-          </a:p>
-          <a:p>
-            <a:pPr marL="0" indent="0">
-              <a:buNone/>
-            </a:pPr>
-            <a:r>
-              <a:rPr lang="de-DE" dirty="0"/>
-              <a:t>4. Lege dieselbe Tabelle als </a:t>
-            </a:r>
-            <a:r>
-              <a:rPr lang="de-DE" b="1" dirty="0"/>
-              <a:t>Array von Objekten </a:t>
-            </a:r>
-            <a:r>
-              <a:rPr lang="de-DE" dirty="0"/>
-              <a:t>an, wobei die Spaltennamen die Schlüssel in den Objekten darstellen. Lass den Nutzer eine Zeilennummer und den Namen einer Spalte angeben, gib den gewünschten Wert aus.</a:t>
-            </a:r>
-            <a:endParaRPr lang="en-US" dirty="0"/>
-          </a:p>
-        </p:txBody>
-      </p:sp>
-      <p:pic>
-        <p:nvPicPr>
-          <p:cNvPr id="4" name="Grafik 3"/>
-          <p:cNvPicPr>
-            <a:picLocks noChangeAspect="1"/>
-          </p:cNvPicPr>
-          <p:nvPr/>
-        </p:nvPicPr>
-        <p:blipFill>
-          <a:blip r:embed="rId2"/>
-          <a:stretch>
-            <a:fillRect/>
-          </a:stretch>
-        </p:blipFill>
-        <p:spPr>
-          <a:xfrm>
-            <a:off x="8394188" y="2057400"/>
-            <a:ext cx="3692770" cy="1230923"/>
-          </a:xfrm>
-          <a:prstGeom prst="rect">
-            <a:avLst/>
-          </a:prstGeom>
-        </p:spPr>
-      </p:pic>
-    </p:spTree>
-    <p:extLst>
-      <p:ext uri="{BB962C8B-B14F-4D97-AF65-F5344CB8AC3E}">
-        <p14:creationId xmlns:p14="http://schemas.microsoft.com/office/powerpoint/2010/main" val="2924150751"/>
-      </p:ext>
-    </p:extLst>
-  </p:cSld>
-  <p:clrMapOvr>
-    <a:masterClrMapping/>
-  </p:clrMapOvr>
-</p:sld>
-</file>
-
-<file path=ppt/slides/slide19.xml><?xml version="1.0" encoding="utf-8"?>
-<p:sld xmlns:a="http://schemas.openxmlformats.org/drawingml/2006/main" xmlns:r="http://schemas.openxmlformats.org/officeDocument/2006/relationships" xmlns:p="http://schemas.openxmlformats.org/presentationml/2006/main">
-  <p:cSld>
-    <p:spTree>
-      <p:nvGrpSpPr>
-        <p:cNvPr id="1" name=""/>
-        <p:cNvGrpSpPr/>
-        <p:nvPr/>
-      </p:nvGrpSpPr>
-      <p:grpSpPr>
-        <a:xfrm>
-          <a:off x="0" y="0"/>
-          <a:ext cx="0" cy="0"/>
-          <a:chOff x="0" y="0"/>
-          <a:chExt cx="0" cy="0"/>
-        </a:xfrm>
-      </p:grpSpPr>
-      <p:sp>
-        <p:nvSpPr>
           <p:cNvPr id="2" name="Titel 1">
             <a:extLst>
               <a:ext uri="{FF2B5EF4-FFF2-40B4-BE49-F238E27FC236}">
@@ -7391,6 +7196,201 @@
     <p:extLst>
       <p:ext uri="{BB962C8B-B14F-4D97-AF65-F5344CB8AC3E}">
         <p14:creationId xmlns:p14="http://schemas.microsoft.com/office/powerpoint/2010/main" val="2615312912"/>
+      </p:ext>
+    </p:extLst>
+  </p:cSld>
+  <p:clrMapOvr>
+    <a:masterClrMapping/>
+  </p:clrMapOvr>
+</p:sld>
+</file>
+
+<file path=ppt/slides/slide19.xml><?xml version="1.0" encoding="utf-8"?>
+<p:sld xmlns:a="http://schemas.openxmlformats.org/drawingml/2006/main" xmlns:r="http://schemas.openxmlformats.org/officeDocument/2006/relationships" xmlns:p="http://schemas.openxmlformats.org/presentationml/2006/main">
+  <p:cSld>
+    <p:spTree>
+      <p:nvGrpSpPr>
+        <p:cNvPr id="1" name=""/>
+        <p:cNvGrpSpPr/>
+        <p:nvPr/>
+      </p:nvGrpSpPr>
+      <p:grpSpPr>
+        <a:xfrm>
+          <a:off x="0" y="0"/>
+          <a:ext cx="0" cy="0"/>
+          <a:chOff x="0" y="0"/>
+          <a:chExt cx="0" cy="0"/>
+        </a:xfrm>
+      </p:grpSpPr>
+      <p:sp>
+        <p:nvSpPr>
+          <p:cNvPr id="2" name="Titel 1"/>
+          <p:cNvSpPr>
+            <a:spLocks noGrp="1"/>
+          </p:cNvSpPr>
+          <p:nvPr>
+            <p:ph type="title"/>
+          </p:nvPr>
+        </p:nvSpPr>
+        <p:spPr>
+          <a:xfrm>
+            <a:off x="1066800" y="685800"/>
+            <a:ext cx="8915402" cy="1371600"/>
+          </a:xfrm>
+        </p:spPr>
+        <p:txBody>
+          <a:bodyPr/>
+          <a:lstStyle/>
+          <a:p>
+            <a:r>
+              <a:rPr lang="de-AT" dirty="0"/>
+              <a:t>Übungen zu Arrays &amp; Objekte</a:t>
+            </a:r>
+            <a:endParaRPr lang="en-US" dirty="0"/>
+          </a:p>
+        </p:txBody>
+      </p:sp>
+      <p:sp>
+        <p:nvSpPr>
+          <p:cNvPr id="3" name="Inhaltsplatzhalter 2"/>
+          <p:cNvSpPr>
+            <a:spLocks noGrp="1"/>
+          </p:cNvSpPr>
+          <p:nvPr>
+            <p:ph idx="1"/>
+          </p:nvPr>
+        </p:nvSpPr>
+        <p:spPr>
+          <a:xfrm>
+            <a:off x="1066800" y="2057400"/>
+            <a:ext cx="7327388" cy="4137259"/>
+          </a:xfrm>
+        </p:spPr>
+        <p:txBody>
+          <a:bodyPr>
+            <a:normAutofit fontScale="92500" lnSpcReduction="20000"/>
+          </a:bodyPr>
+          <a:lstStyle/>
+          <a:p>
+            <a:pPr marL="0" indent="0">
+              <a:buNone/>
+            </a:pPr>
+            <a:r>
+              <a:rPr lang="de-DE" dirty="0"/>
+              <a:t>1. Definiere die Wochentage in einem </a:t>
+            </a:r>
+            <a:r>
+              <a:rPr lang="de-DE" b="1" dirty="0"/>
+              <a:t>Array</a:t>
+            </a:r>
+            <a:r>
+              <a:rPr lang="de-DE" dirty="0"/>
+              <a:t>, lese vom Nutzer eine Zahl von 1-7 ein und gib den entsprechenden Wochentag aus dem Array aus.</a:t>
+            </a:r>
+          </a:p>
+          <a:p>
+            <a:pPr marL="0" indent="0">
+              <a:buNone/>
+            </a:pPr>
+            <a:r>
+              <a:rPr lang="de-DE" dirty="0"/>
+              <a:t>2. Definiere ein </a:t>
+            </a:r>
+            <a:r>
+              <a:rPr lang="de-DE" b="1" dirty="0"/>
+              <a:t>Objekt </a:t>
+            </a:r>
+            <a:r>
+              <a:rPr lang="de-DE" dirty="0"/>
+              <a:t>mit diversen Daten eures </a:t>
+            </a:r>
+            <a:r>
+              <a:rPr lang="de-DE" dirty="0" err="1"/>
+              <a:t>lieblings</a:t>
+            </a:r>
+            <a:r>
+              <a:rPr lang="de-DE" dirty="0"/>
+              <a:t> Fahrzeugs (Auto, Motorrad, Fahrrad, ...), dabei sollten verschiedene Datentypen verwendet werden. Gebt die Daten mit einem Template </a:t>
+            </a:r>
+            <a:r>
+              <a:rPr lang="de-DE" dirty="0" err="1"/>
+              <a:t>Literal</a:t>
+            </a:r>
+            <a:r>
+              <a:rPr lang="de-DE" dirty="0"/>
+              <a:t> schön formatiert aus.</a:t>
+            </a:r>
+          </a:p>
+          <a:p>
+            <a:pPr marL="0" indent="0">
+              <a:buNone/>
+            </a:pPr>
+            <a:r>
+              <a:rPr lang="de-DE" dirty="0"/>
+              <a:t>3. Definiere die abgebildete Tabelle als </a:t>
+            </a:r>
+            <a:r>
+              <a:rPr lang="de-DE" b="1" dirty="0"/>
+              <a:t>zweidimensionales Array </a:t>
+            </a:r>
+            <a:r>
+              <a:rPr lang="de-DE" dirty="0"/>
+              <a:t>und lass den Benutzer eine Zeilen und Spaltennummer angeben, gib den gewünschten Wert </a:t>
+            </a:r>
+            <a:r>
+              <a:rPr lang="en-US" dirty="0" err="1"/>
+              <a:t>aus.</a:t>
+            </a:r>
+            <a:endParaRPr lang="en-US" dirty="0"/>
+          </a:p>
+          <a:p>
+            <a:pPr marL="0" indent="0">
+              <a:buNone/>
+            </a:pPr>
+            <a:r>
+              <a:rPr lang="de-DE" dirty="0"/>
+              <a:t>4. Lege dieselbe Tabelle als </a:t>
+            </a:r>
+            <a:r>
+              <a:rPr lang="de-DE" b="1" dirty="0"/>
+              <a:t>Array von Objekten </a:t>
+            </a:r>
+            <a:r>
+              <a:rPr lang="de-DE" dirty="0"/>
+              <a:t>an, wobei die Spaltennamen die Schlüssel in den Objekten darstellen. Lass den Nutzer eine Zeilennummer und den Namen einer Spalte angeben, gib den gewünschten Wert aus.</a:t>
+            </a:r>
+            <a:endParaRPr lang="en-US" dirty="0"/>
+          </a:p>
+        </p:txBody>
+      </p:sp>
+      <p:pic>
+        <p:nvPicPr>
+          <p:cNvPr id="4" name="Grafik 3"/>
+          <p:cNvPicPr>
+            <a:picLocks noChangeAspect="1"/>
+          </p:cNvPicPr>
+          <p:nvPr/>
+        </p:nvPicPr>
+        <p:blipFill>
+          <a:blip r:embed="rId2"/>
+          <a:stretch>
+            <a:fillRect/>
+          </a:stretch>
+        </p:blipFill>
+        <p:spPr>
+          <a:xfrm>
+            <a:off x="8394188" y="2057400"/>
+            <a:ext cx="3692770" cy="1230923"/>
+          </a:xfrm>
+          <a:prstGeom prst="rect">
+            <a:avLst/>
+          </a:prstGeom>
+        </p:spPr>
+      </p:pic>
+    </p:spTree>
+    <p:extLst>
+      <p:ext uri="{BB962C8B-B14F-4D97-AF65-F5344CB8AC3E}">
+        <p14:creationId xmlns:p14="http://schemas.microsoft.com/office/powerpoint/2010/main" val="2924150751"/>
       </p:ext>
     </p:extLst>
   </p:cSld>

</xml_diff>